<commit_message>
Dodany slajd do prezentacji o słownikach: URL do repozytorium
</commit_message>
<xml_diff>
--- a/prezentacje/2015-03-25_dict.pptx
+++ b/prezentacje/2015-03-25_dict.pptx
@@ -23,6 +23,7 @@
     <p:sldId id="271" r:id="rId17"/>
     <p:sldId id="272" r:id="rId18"/>
     <p:sldId id="273" r:id="rId19"/>
+    <p:sldId id="274" r:id="rId20"/>
   </p:sldIdLst>
   <p:sldSz cx="12192000" cy="6858000"/>
   <p:notesSz cx="6858000" cy="9144000"/>
@@ -260,7 +261,7 @@
           <a:p>
             <a:fld id="{F3DF43A4-AE59-4E7B-A1AF-F5A7E30FB170}" type="datetimeFigureOut">
               <a:rPr lang="pl-PL" smtClean="0"/>
-              <a:t>2015-03-24</a:t>
+              <a:t>2015-03-25</a:t>
             </a:fld>
             <a:endParaRPr lang="pl-PL"/>
           </a:p>
@@ -430,7 +431,7 @@
           <a:p>
             <a:fld id="{F3DF43A4-AE59-4E7B-A1AF-F5A7E30FB170}" type="datetimeFigureOut">
               <a:rPr lang="pl-PL" smtClean="0"/>
-              <a:t>2015-03-24</a:t>
+              <a:t>2015-03-25</a:t>
             </a:fld>
             <a:endParaRPr lang="pl-PL"/>
           </a:p>
@@ -610,7 +611,7 @@
           <a:p>
             <a:fld id="{F3DF43A4-AE59-4E7B-A1AF-F5A7E30FB170}" type="datetimeFigureOut">
               <a:rPr lang="pl-PL" smtClean="0"/>
-              <a:t>2015-03-24</a:t>
+              <a:t>2015-03-25</a:t>
             </a:fld>
             <a:endParaRPr lang="pl-PL"/>
           </a:p>
@@ -780,7 +781,7 @@
           <a:p>
             <a:fld id="{F3DF43A4-AE59-4E7B-A1AF-F5A7E30FB170}" type="datetimeFigureOut">
               <a:rPr lang="pl-PL" smtClean="0"/>
-              <a:t>2015-03-24</a:t>
+              <a:t>2015-03-25</a:t>
             </a:fld>
             <a:endParaRPr lang="pl-PL"/>
           </a:p>
@@ -1026,7 +1027,7 @@
           <a:p>
             <a:fld id="{F3DF43A4-AE59-4E7B-A1AF-F5A7E30FB170}" type="datetimeFigureOut">
               <a:rPr lang="pl-PL" smtClean="0"/>
-              <a:t>2015-03-24</a:t>
+              <a:t>2015-03-25</a:t>
             </a:fld>
             <a:endParaRPr lang="pl-PL"/>
           </a:p>
@@ -1258,7 +1259,7 @@
           <a:p>
             <a:fld id="{F3DF43A4-AE59-4E7B-A1AF-F5A7E30FB170}" type="datetimeFigureOut">
               <a:rPr lang="pl-PL" smtClean="0"/>
-              <a:t>2015-03-24</a:t>
+              <a:t>2015-03-25</a:t>
             </a:fld>
             <a:endParaRPr lang="pl-PL"/>
           </a:p>
@@ -1625,7 +1626,7 @@
           <a:p>
             <a:fld id="{F3DF43A4-AE59-4E7B-A1AF-F5A7E30FB170}" type="datetimeFigureOut">
               <a:rPr lang="pl-PL" smtClean="0"/>
-              <a:t>2015-03-24</a:t>
+              <a:t>2015-03-25</a:t>
             </a:fld>
             <a:endParaRPr lang="pl-PL"/>
           </a:p>
@@ -1743,7 +1744,7 @@
           <a:p>
             <a:fld id="{F3DF43A4-AE59-4E7B-A1AF-F5A7E30FB170}" type="datetimeFigureOut">
               <a:rPr lang="pl-PL" smtClean="0"/>
-              <a:t>2015-03-24</a:t>
+              <a:t>2015-03-25</a:t>
             </a:fld>
             <a:endParaRPr lang="pl-PL"/>
           </a:p>
@@ -1838,7 +1839,7 @@
           <a:p>
             <a:fld id="{F3DF43A4-AE59-4E7B-A1AF-F5A7E30FB170}" type="datetimeFigureOut">
               <a:rPr lang="pl-PL" smtClean="0"/>
-              <a:t>2015-03-24</a:t>
+              <a:t>2015-03-25</a:t>
             </a:fld>
             <a:endParaRPr lang="pl-PL"/>
           </a:p>
@@ -2115,7 +2116,7 @@
           <a:p>
             <a:fld id="{F3DF43A4-AE59-4E7B-A1AF-F5A7E30FB170}" type="datetimeFigureOut">
               <a:rPr lang="pl-PL" smtClean="0"/>
-              <a:t>2015-03-24</a:t>
+              <a:t>2015-03-25</a:t>
             </a:fld>
             <a:endParaRPr lang="pl-PL"/>
           </a:p>
@@ -2368,7 +2369,7 @@
           <a:p>
             <a:fld id="{F3DF43A4-AE59-4E7B-A1AF-F5A7E30FB170}" type="datetimeFigureOut">
               <a:rPr lang="pl-PL" smtClean="0"/>
-              <a:t>2015-03-24</a:t>
+              <a:t>2015-03-25</a:t>
             </a:fld>
             <a:endParaRPr lang="pl-PL"/>
           </a:p>
@@ -2581,7 +2582,7 @@
           <a:p>
             <a:fld id="{F3DF43A4-AE59-4E7B-A1AF-F5A7E30FB170}" type="datetimeFigureOut">
               <a:rPr lang="pl-PL" smtClean="0"/>
-              <a:t>2015-03-24</a:t>
+              <a:t>2015-03-25</a:t>
             </a:fld>
             <a:endParaRPr lang="pl-PL"/>
           </a:p>
@@ -3097,11 +3098,7 @@
             </a:r>
             <a:r>
               <a:rPr lang="pl-PL" dirty="0" smtClean="0"/>
-              <a:t>– </a:t>
-            </a:r>
-            <a:r>
-              <a:rPr lang="pl-PL" dirty="0" smtClean="0"/>
-              <a:t>dodawanie elementów</a:t>
+              <a:t>– dodawanie elementów</a:t>
             </a:r>
             <a:endParaRPr lang="pl-PL" dirty="0"/>
           </a:p>
@@ -3191,11 +3188,7 @@
             </a:r>
             <a:r>
               <a:rPr lang="pl-PL" dirty="0" smtClean="0"/>
-              <a:t>– </a:t>
-            </a:r>
-            <a:r>
-              <a:rPr lang="pl-PL" dirty="0" smtClean="0"/>
-              <a:t>usuwanie elementów</a:t>
+              <a:t>– usuwanie elementów</a:t>
             </a:r>
             <a:endParaRPr lang="pl-PL" dirty="0"/>
           </a:p>
@@ -3285,11 +3278,7 @@
             </a:r>
             <a:r>
               <a:rPr lang="pl-PL" dirty="0" smtClean="0"/>
-              <a:t>– </a:t>
-            </a:r>
-            <a:r>
-              <a:rPr lang="pl-PL" dirty="0" smtClean="0"/>
-              <a:t>modyfikowanie elementów</a:t>
+              <a:t>– modyfikowanie elementów</a:t>
             </a:r>
             <a:endParaRPr lang="pl-PL" dirty="0"/>
           </a:p>
@@ -3379,11 +3368,7 @@
             </a:r>
             <a:r>
               <a:rPr lang="pl-PL" dirty="0" smtClean="0"/>
-              <a:t>– </a:t>
-            </a:r>
-            <a:r>
-              <a:rPr lang="pl-PL" dirty="0" smtClean="0"/>
-              <a:t>dostęp do elementów</a:t>
+              <a:t>– dostęp do elementów</a:t>
             </a:r>
             <a:endParaRPr lang="pl-PL" dirty="0"/>
           </a:p>
@@ -3473,11 +3458,7 @@
             </a:r>
             <a:r>
               <a:rPr lang="pl-PL" dirty="0" smtClean="0"/>
-              <a:t>– </a:t>
-            </a:r>
-            <a:r>
-              <a:rPr lang="pl-PL" dirty="0" smtClean="0"/>
-              <a:t>porównywanie</a:t>
+              <a:t>– porównywanie</a:t>
             </a:r>
             <a:endParaRPr lang="pl-PL" dirty="0"/>
           </a:p>
@@ -3567,11 +3548,7 @@
             </a:r>
             <a:r>
               <a:rPr lang="pl-PL" dirty="0" smtClean="0"/>
-              <a:t>– </a:t>
-            </a:r>
-            <a:r>
-              <a:rPr lang="pl-PL" dirty="0" smtClean="0"/>
-              <a:t>porównywanie</a:t>
+              <a:t>– porównywanie</a:t>
             </a:r>
             <a:endParaRPr lang="pl-PL" dirty="0"/>
           </a:p>
@@ -3655,11 +3632,7 @@
             </a:r>
             <a:r>
               <a:rPr lang="pl-PL" dirty="0" smtClean="0"/>
-              <a:t>– </a:t>
-            </a:r>
-            <a:r>
-              <a:rPr lang="pl-PL" dirty="0" smtClean="0"/>
-              <a:t>wiele innych przydatnych operacji!</a:t>
+              <a:t>– wiele innych przydatnych operacji!</a:t>
             </a:r>
             <a:endParaRPr lang="pl-PL" dirty="0"/>
           </a:p>
@@ -3742,11 +3715,7 @@
             </a:r>
             <a:r>
               <a:rPr lang="pl-PL" dirty="0" smtClean="0"/>
-              <a:t>– </a:t>
-            </a:r>
-            <a:r>
-              <a:rPr lang="pl-PL" dirty="0" smtClean="0"/>
-              <a:t>składnia</a:t>
+              <a:t>– składnia</a:t>
             </a:r>
             <a:endParaRPr lang="pl-PL" dirty="0"/>
           </a:p>
@@ -3776,13 +3745,8 @@
           <a:p>
             <a:r>
               <a:rPr lang="pl-PL" dirty="0" smtClean="0"/>
-              <a:t>Czym się różnią zaznaczon</a:t>
-            </a:r>
-            <a:r>
-              <a:rPr lang="pl-PL" dirty="0" smtClean="0"/>
-              <a:t>e dwukropki?</a:t>
-            </a:r>
-            <a:endParaRPr lang="pl-PL" dirty="0" smtClean="0"/>
+              <a:t>Czym się różnią zaznaczone dwukropki?</a:t>
+            </a:r>
           </a:p>
           <a:p>
             <a:endParaRPr lang="pl-PL" dirty="0" smtClean="0"/>
@@ -3918,6 +3882,81 @@
 </p:sld>
 </file>
 
+<file path=ppt/slides/slide19.xml><?xml version="1.0" encoding="utf-8"?>
+<p:sld xmlns:a="http://schemas.openxmlformats.org/drawingml/2006/main" xmlns:r="http://schemas.openxmlformats.org/officeDocument/2006/relationships" xmlns:p="http://schemas.openxmlformats.org/presentationml/2006/main">
+  <p:cSld>
+    <p:spTree>
+      <p:nvGrpSpPr>
+        <p:cNvPr id="1" name=""/>
+        <p:cNvGrpSpPr/>
+        <p:nvPr/>
+      </p:nvGrpSpPr>
+      <p:grpSpPr>
+        <a:xfrm>
+          <a:off x="0" y="0"/>
+          <a:ext cx="0" cy="0"/>
+          <a:chOff x="0" y="0"/>
+          <a:chExt cx="0" cy="0"/>
+        </a:xfrm>
+      </p:grpSpPr>
+      <p:sp>
+        <p:nvSpPr>
+          <p:cNvPr id="2" name="Tytuł 1"/>
+          <p:cNvSpPr>
+            <a:spLocks noGrp="1"/>
+          </p:cNvSpPr>
+          <p:nvPr>
+            <p:ph type="title"/>
+          </p:nvPr>
+        </p:nvSpPr>
+        <p:spPr/>
+        <p:txBody>
+          <a:bodyPr/>
+          <a:lstStyle/>
+          <a:p>
+            <a:r>
+              <a:rPr lang="pl-PL" dirty="0" smtClean="0"/>
+              <a:t>Zadania!</a:t>
+            </a:r>
+            <a:endParaRPr lang="pl-PL" dirty="0"/>
+          </a:p>
+        </p:txBody>
+      </p:sp>
+      <p:sp>
+        <p:nvSpPr>
+          <p:cNvPr id="3" name="Symbol zastępczy zawartości 2"/>
+          <p:cNvSpPr>
+            <a:spLocks noGrp="1"/>
+          </p:cNvSpPr>
+          <p:nvPr>
+            <p:ph idx="1"/>
+          </p:nvPr>
+        </p:nvSpPr>
+        <p:spPr/>
+        <p:txBody>
+          <a:bodyPr/>
+          <a:lstStyle/>
+          <a:p>
+            <a:r>
+              <a:rPr lang="pl-PL" dirty="0"/>
+              <a:t>https://github.com/CodeCarrots/warsztaty_2015</a:t>
+            </a:r>
+          </a:p>
+        </p:txBody>
+      </p:sp>
+    </p:spTree>
+    <p:extLst>
+      <p:ext uri="{BB962C8B-B14F-4D97-AF65-F5344CB8AC3E}">
+        <p14:creationId xmlns:p14="http://schemas.microsoft.com/office/powerpoint/2010/main" val="2886621689"/>
+      </p:ext>
+    </p:extLst>
+  </p:cSld>
+  <p:clrMapOvr>
+    <a:masterClrMapping/>
+  </p:clrMapOvr>
+</p:sld>
+</file>
+
 <file path=ppt/slides/slide2.xml><?xml version="1.0" encoding="utf-8"?>
 <p:sld xmlns:a="http://schemas.openxmlformats.org/drawingml/2006/main" xmlns:r="http://schemas.openxmlformats.org/officeDocument/2006/relationships" xmlns:p="http://schemas.openxmlformats.org/presentationml/2006/main">
   <p:cSld>
@@ -6008,11 +6047,7 @@
             </a:r>
             <a:r>
               <a:rPr lang="pl-PL" dirty="0" smtClean="0"/>
-              <a:t>– </a:t>
-            </a:r>
-            <a:r>
-              <a:rPr lang="pl-PL" dirty="0" smtClean="0"/>
-              <a:t>podstawowe operacje</a:t>
+              <a:t>– podstawowe operacje</a:t>
             </a:r>
             <a:endParaRPr lang="pl-PL" dirty="0"/>
           </a:p>
@@ -6077,7 +6112,6 @@
               <a:rPr lang="pl-PL" dirty="0" smtClean="0"/>
               <a:t>Dostęp do elementów</a:t>
             </a:r>
-            <a:endParaRPr lang="pl-PL" dirty="0" smtClean="0"/>
           </a:p>
           <a:p>
             <a:r>
@@ -6148,11 +6182,7 @@
             </a:r>
             <a:r>
               <a:rPr lang="pl-PL" dirty="0" smtClean="0"/>
-              <a:t>– </a:t>
-            </a:r>
-            <a:r>
-              <a:rPr lang="pl-PL" dirty="0" smtClean="0"/>
-              <a:t>tworzenie</a:t>
+              <a:t>– tworzenie</a:t>
             </a:r>
             <a:endParaRPr lang="pl-PL" dirty="0"/>
           </a:p>

</xml_diff>